<commit_message>
Alterações no manual e na documentação.
</commit_message>
<xml_diff>
--- a/Docs/Manual ferramenta checagem de presença por reconhecimento facial.pptx
+++ b/Docs/Manual ferramenta checagem de presença por reconhecimento facial.pptx
@@ -5801,7 +5801,7 @@
         <p:spPr>
           <a:xfrm>
             <a:off x="1438787" y="826737"/>
-            <a:ext cx="4769779" cy="400110"/>
+            <a:ext cx="7562574" cy="400110"/>
           </a:xfrm>
           <a:prstGeom prst="rect">
             <a:avLst/>
@@ -5824,7 +5824,7 @@
                 <a:latin typeface="Arial Narrow" panose="020B0606020202030204" pitchFamily="34" charset="0"/>
                 <a:cs typeface="Arial" panose="020B0604020202020204" pitchFamily="34" charset="0"/>
               </a:rPr>
-              <a:t>Página inicial – Visão Professor</a:t>
+              <a:t>Página para visualizar e alterar presenças manualmente – Visão Professor</a:t>
             </a:r>
           </a:p>
         </p:txBody>
@@ -14766,7 +14766,7 @@
         <p:spPr>
           <a:xfrm>
             <a:off x="1438787" y="826737"/>
-            <a:ext cx="4769779" cy="400110"/>
+            <a:ext cx="5520066" cy="400110"/>
           </a:xfrm>
           <a:prstGeom prst="rect">
             <a:avLst/>
@@ -14789,7 +14789,7 @@
                 <a:latin typeface="Arial Narrow" panose="020B0606020202030204" pitchFamily="34" charset="0"/>
                 <a:cs typeface="Arial" panose="020B0604020202020204" pitchFamily="34" charset="0"/>
               </a:rPr>
-              <a:t>Página inicial – Visão Professor</a:t>
+              <a:t>Página adicionar e editar aulas – Visão Administrador</a:t>
             </a:r>
           </a:p>
         </p:txBody>

</xml_diff>